<commit_message>
Mudanças (Referente aos testes) na Sala de Aula
...
</commit_message>
<xml_diff>
--- a/Docs/Apresentação TSW-Atualizada.pptx
+++ b/Docs/Apresentação TSW-Atualizada.pptx
@@ -6343,17 +6343,23 @@
         </p:nvSpPr>
         <p:spPr>
           <a:xfrm>
-            <a:off x="909836" y="2852936"/>
-            <a:ext cx="10360501" cy="1223963"/>
+            <a:off x="1625176" y="1844824"/>
+            <a:ext cx="8938472" cy="787151"/>
           </a:xfrm>
         </p:spPr>
         <p:txBody>
-          <a:bodyPr/>
+          <a:bodyPr>
+            <a:normAutofit fontScale="90000"/>
+          </a:bodyPr>
           <a:lstStyle/>
           <a:p>
             <a:r>
+              <a:rPr lang="pt-BR" sz="6000" dirty="0"/>
+              <a:t>The</a:t>
+            </a:r>
+            <a:r>
               <a:rPr lang="pt-BR" dirty="0"/>
-              <a:t>The Grinder</a:t>
+              <a:t> Grinder</a:t>
             </a:r>
           </a:p>
         </p:txBody>
@@ -8013,8 +8019,8 @@
         </p:nvSpPr>
         <p:spPr>
           <a:xfrm>
-            <a:off x="981844" y="2780928"/>
-            <a:ext cx="10360501" cy="1223963"/>
+            <a:off x="1625176" y="1628800"/>
+            <a:ext cx="8938472" cy="1041080"/>
           </a:xfrm>
         </p:spPr>
         <p:txBody>
@@ -8117,15 +8123,7 @@
             </a:pPr>
             <a:r>
               <a:rPr lang="pt-BR" dirty="0"/>
-              <a:t>Coleção de decoradores para medir performance </a:t>
-            </a:r>
-            <a:r>
-              <a:rPr lang="pt-BR" dirty="0" err="1"/>
-              <a:t>eescalabilidade</a:t>
-            </a:r>
-            <a:r>
-              <a:rPr lang="pt-BR" dirty="0"/>
-              <a:t> em testes JUnit existentes</a:t>
+              <a:t>Coleção de decoradores para medir performance e escalabilidade em testes JUnit existentes</a:t>
             </a:r>
           </a:p>
           <a:p>
@@ -8260,7 +8258,7 @@
             </a:pPr>
             <a:r>
               <a:rPr lang="pt-BR" dirty="0"/>
-              <a:t>Define um tempo máximo para a execução. Teste a falha se a execução durar mais que o tempo estabelecido</a:t>
+              <a:t>Define um tempo máximo para a execução. A falha acorre se a execução durar mais que o tempo estabelecido.</a:t>
             </a:r>
           </a:p>
           <a:p>
@@ -8284,16 +8282,7 @@
             </a:pPr>
             <a:r>
               <a:rPr lang="pt-BR" dirty="0"/>
-              <a:t>Utiliza timers para distribuir as cargas usando distribuições randômicas</a:t>
-            </a:r>
-          </a:p>
-          <a:p>
-            <a:pPr marL="0" indent="0">
-              <a:buNone/>
-            </a:pPr>
-            <a:r>
-              <a:rPr lang="pt-BR" dirty="0"/>
-              <a:t>Combinado com timertest para medir tempo com carga.</a:t>
+              <a:t>Utiliza timers para distribuir as cargas usando distribuições randômicas combinado com timertest para medir tempo com carga.</a:t>
             </a:r>
           </a:p>
           <a:p>
@@ -8521,12 +8510,12 @@
         <p:spPr>
           <a:xfrm>
             <a:off x="1218883" y="1701796"/>
-            <a:ext cx="10204121" cy="4823547"/>
+            <a:ext cx="10360501" cy="4823547"/>
           </a:xfrm>
         </p:spPr>
         <p:txBody>
           <a:bodyPr>
-            <a:normAutofit lnSpcReduction="10000"/>
+            <a:normAutofit fontScale="92500"/>
           </a:bodyPr>
           <a:lstStyle/>
           <a:p>
@@ -8544,27 +8533,26 @@
           <a:p>
             <a:r>
               <a:rPr lang="pt-BR" dirty="0"/>
-              <a:t>2. Executar um profiler para descobrir os </a:t>
-            </a:r>
-            <a:r>
-              <a:rPr lang="pt-BR" dirty="0" err="1"/>
-              <a:t>gargalos.utilizar</a:t>
-            </a:r>
+              <a:t>2. Executar um profiler para descobrir os gargalos e utilizar os dados obtidos como parâmetros para estabelecer os valores máximos aceitáveis para cada método.</a:t>
+            </a:r>
+          </a:p>
+          <a:p>
             <a:r>
               <a:rPr lang="pt-BR" dirty="0"/>
-              <a:t> os dados obtidos como parâmetros para estabelecer os valores máximos aceitáveis para cada método.</a:t>
+              <a:t>3. Escrever testes do JUnit (se não existirem) para os trechos críticos de performance.</a:t>
             </a:r>
           </a:p>
           <a:p>
             <a:r>
               <a:rPr lang="pt-BR" dirty="0"/>
-              <a:t>3. Escrever testes do JUnit (se não existirem) para os trechos críticos quanto à performance.</a:t>
-            </a:r>
-          </a:p>
-          <a:p>
-            <a:r>
+              <a:t>4. Escrever um TimedTest do JUnitPerf para cada teste novo e executá-lo.</a:t>
+            </a:r>
+            <a:br>
               <a:rPr lang="pt-BR" dirty="0"/>
-              <a:t>4. Escrever um TimedTest do JUnitPerf para cada teste novo e executá-lo. O teste deve falhar. Se passar, não há problema de performance com o Código.</a:t>
+            </a:br>
+            <a:r>
+              <a:rPr lang="pt-BR" dirty="0"/>
+              <a:t>O teste deve falhar. Se passar, não há problema de performance com o Código.</a:t>
             </a:r>
           </a:p>
           <a:p>
@@ -8626,8 +8614,8 @@
         </p:nvSpPr>
         <p:spPr>
           <a:xfrm>
-            <a:off x="1125860" y="2780928"/>
-            <a:ext cx="10360501" cy="1223963"/>
+            <a:off x="1629415" y="1700808"/>
+            <a:ext cx="8938472" cy="969072"/>
           </a:xfrm>
         </p:spPr>
         <p:txBody>
@@ -9696,8 +9684,8 @@
         </p:nvSpPr>
         <p:spPr>
           <a:xfrm>
-            <a:off x="1197868" y="2780928"/>
-            <a:ext cx="10360501" cy="1223963"/>
+            <a:off x="1625176" y="1628800"/>
+            <a:ext cx="8938472" cy="1041080"/>
           </a:xfrm>
         </p:spPr>
         <p:txBody>
@@ -10223,18 +10211,21 @@
         </p:nvSpPr>
         <p:spPr>
           <a:xfrm>
-            <a:off x="1125860" y="2780928"/>
-            <a:ext cx="10360501" cy="1223963"/>
+            <a:off x="1557908" y="1772816"/>
+            <a:ext cx="8938472" cy="825056"/>
           </a:xfrm>
         </p:spPr>
         <p:txBody>
-          <a:bodyPr/>
+          <a:bodyPr>
+            <a:normAutofit fontScale="90000"/>
+          </a:bodyPr>
           <a:lstStyle/>
           <a:p>
             <a:r>
-              <a:rPr lang="pt-BR" dirty="0"/>
+              <a:rPr lang="pt-BR" sz="6000" dirty="0"/>
               <a:t>OpenSTA</a:t>
             </a:r>
+            <a:endParaRPr lang="pt-BR" dirty="0"/>
           </a:p>
         </p:txBody>
       </p:sp>
@@ -11214,6 +11205,15 @@
 </file>
 
 <file path=customXml/item1.xml><?xml version="1.0" encoding="utf-8"?>
+<?mso-contentType ?>
+<FormTemplates xmlns="http://schemas.microsoft.com/sharepoint/v3/contenttype/forms">
+  <Display>DocumentLibraryForm</Display>
+  <Edit>AssetEditForm</Edit>
+  <New>DocumentLibraryForm</New>
+</FormTemplates>
+</file>
+
+<file path=customXml/item2.xml><?xml version="1.0" encoding="utf-8"?>
 <ct:contentTypeSchema xmlns:ct="http://schemas.microsoft.com/office/2006/metadata/contentType" xmlns:ma="http://schemas.microsoft.com/office/2006/metadata/properties/metaAttributes" ct:_="" ma:_="" ma:contentTypeName="TemplateFile" ma:contentTypeID="0x0101006EDDDB5EE6D98C44930B742096920B300400F5B6D36B3EF94B4E9A635CDF2A18F5B8" ma:contentTypeVersion="72" ma:contentTypeDescription="Create a new document." ma:contentTypeScope="" ma:versionID="a23e56308344d904b51738559c3d67c9">
   <xsd:schema xmlns:xsd="http://www.w3.org/2001/XMLSchema" xmlns:xs="http://www.w3.org/2001/XMLSchema" xmlns:p="http://schemas.microsoft.com/office/2006/metadata/properties" xmlns:ns2="4873beb7-5857-4685-be1f-d57550cc96cc" targetNamespace="http://schemas.microsoft.com/office/2006/metadata/properties" ma:root="true" ma:fieldsID="cd0908cc4600e77bf5da051303e00c8d" ns2:_="">
     <xsd:import namespace="4873beb7-5857-4685-be1f-d57550cc96cc"/>
@@ -12253,15 +12253,6 @@
 </ct:contentTypeSchema>
 </file>
 
-<file path=customXml/item2.xml><?xml version="1.0" encoding="utf-8"?>
-<?mso-contentType ?>
-<FormTemplates xmlns="http://schemas.microsoft.com/sharepoint/v3/contenttype/forms">
-  <Display>DocumentLibraryForm</Display>
-  <Edit>AssetEditForm</Edit>
-  <New>DocumentLibraryForm</New>
-</FormTemplates>
-</file>
-
 <file path=customXml/item3.xml><?xml version="1.0" encoding="utf-8"?>
 <p:properties xmlns:p="http://schemas.microsoft.com/office/2006/metadata/properties" xmlns:xsi="http://www.w3.org/2001/XMLSchema-instance" xmlns:pc="http://schemas.microsoft.com/office/infopath/2007/PartnerControls">
   <documentManagement>
@@ -12399,6 +12390,14 @@
 </file>
 
 <file path=customXml/itemProps1.xml><?xml version="1.0" encoding="utf-8"?>
+<ds:datastoreItem xmlns:ds="http://schemas.openxmlformats.org/officeDocument/2006/customXml" ds:itemID="{3836F65B-1B07-41EE-A0E8-BC6EF3855225}">
+  <ds:schemaRefs>
+    <ds:schemaRef ds:uri="http://schemas.microsoft.com/sharepoint/v3/contenttype/forms"/>
+  </ds:schemaRefs>
+</ds:datastoreItem>
+</file>
+
+<file path=customXml/itemProps2.xml><?xml version="1.0" encoding="utf-8"?>
 <ds:datastoreItem xmlns:ds="http://schemas.openxmlformats.org/officeDocument/2006/customXml" ds:itemID="{A09BF4D4-EF60-4196-BFC3-9462D607978C}">
   <ds:schemaRefs>
     <ds:schemaRef ds:uri="http://schemas.microsoft.com/office/2006/metadata/contentType"/>
@@ -12412,14 +12411,6 @@
     <ds:schemaRef ds:uri="http://purl.org/dc/elements/1.1/"/>
     <ds:schemaRef ds:uri="http://purl.org/dc/terms/"/>
     <ds:schemaRef ds:uri="http://schemas.microsoft.com/internal/obd"/>
-  </ds:schemaRefs>
-</ds:datastoreItem>
-</file>
-
-<file path=customXml/itemProps2.xml><?xml version="1.0" encoding="utf-8"?>
-<ds:datastoreItem xmlns:ds="http://schemas.openxmlformats.org/officeDocument/2006/customXml" ds:itemID="{3836F65B-1B07-41EE-A0E8-BC6EF3855225}">
-  <ds:schemaRefs>
-    <ds:schemaRef ds:uri="http://schemas.microsoft.com/sharepoint/v3/contenttype/forms"/>
   </ds:schemaRefs>
 </ds:datastoreItem>
 </file>

</xml_diff>